<commit_message>
Problemi con grafici di anonimizzazione. Risoluzione effettuate
</commit_message>
<xml_diff>
--- a/Presentazione.pptx
+++ b/Presentazione.pptx
@@ -278,7 +278,7 @@
           <a:p>
             <a:fld id="{0E4CDD72-A63B-C044-8A2C-F1FDCDA64E36}" type="datetimeFigureOut">
               <a:rPr lang="it-IT" smtClean="0"/>
-              <a:t>28/01/20</a:t>
+              <a:t>30/01/20</a:t>
             </a:fld>
             <a:endParaRPr lang="it-IT"/>
           </a:p>
@@ -476,7 +476,7 @@
           <a:p>
             <a:fld id="{0E4CDD72-A63B-C044-8A2C-F1FDCDA64E36}" type="datetimeFigureOut">
               <a:rPr lang="it-IT" smtClean="0"/>
-              <a:t>28/01/20</a:t>
+              <a:t>30/01/20</a:t>
             </a:fld>
             <a:endParaRPr lang="it-IT"/>
           </a:p>
@@ -684,7 +684,7 @@
           <a:p>
             <a:fld id="{0E4CDD72-A63B-C044-8A2C-F1FDCDA64E36}" type="datetimeFigureOut">
               <a:rPr lang="it-IT" smtClean="0"/>
-              <a:t>28/01/20</a:t>
+              <a:t>30/01/20</a:t>
             </a:fld>
             <a:endParaRPr lang="it-IT"/>
           </a:p>
@@ -882,7 +882,7 @@
           <a:p>
             <a:fld id="{0E4CDD72-A63B-C044-8A2C-F1FDCDA64E36}" type="datetimeFigureOut">
               <a:rPr lang="it-IT" smtClean="0"/>
-              <a:t>28/01/20</a:t>
+              <a:t>30/01/20</a:t>
             </a:fld>
             <a:endParaRPr lang="it-IT"/>
           </a:p>
@@ -1157,7 +1157,7 @@
           <a:p>
             <a:fld id="{0E4CDD72-A63B-C044-8A2C-F1FDCDA64E36}" type="datetimeFigureOut">
               <a:rPr lang="it-IT" smtClean="0"/>
-              <a:t>28/01/20</a:t>
+              <a:t>30/01/20</a:t>
             </a:fld>
             <a:endParaRPr lang="it-IT"/>
           </a:p>
@@ -1422,7 +1422,7 @@
           <a:p>
             <a:fld id="{0E4CDD72-A63B-C044-8A2C-F1FDCDA64E36}" type="datetimeFigureOut">
               <a:rPr lang="it-IT" smtClean="0"/>
-              <a:t>28/01/20</a:t>
+              <a:t>30/01/20</a:t>
             </a:fld>
             <a:endParaRPr lang="it-IT"/>
           </a:p>
@@ -1834,7 +1834,7 @@
           <a:p>
             <a:fld id="{0E4CDD72-A63B-C044-8A2C-F1FDCDA64E36}" type="datetimeFigureOut">
               <a:rPr lang="it-IT" smtClean="0"/>
-              <a:t>28/01/20</a:t>
+              <a:t>30/01/20</a:t>
             </a:fld>
             <a:endParaRPr lang="it-IT"/>
           </a:p>
@@ -1975,7 +1975,7 @@
           <a:p>
             <a:fld id="{0E4CDD72-A63B-C044-8A2C-F1FDCDA64E36}" type="datetimeFigureOut">
               <a:rPr lang="it-IT" smtClean="0"/>
-              <a:t>28/01/20</a:t>
+              <a:t>30/01/20</a:t>
             </a:fld>
             <a:endParaRPr lang="it-IT"/>
           </a:p>
@@ -2088,7 +2088,7 @@
           <a:p>
             <a:fld id="{0E4CDD72-A63B-C044-8A2C-F1FDCDA64E36}" type="datetimeFigureOut">
               <a:rPr lang="it-IT" smtClean="0"/>
-              <a:t>28/01/20</a:t>
+              <a:t>30/01/20</a:t>
             </a:fld>
             <a:endParaRPr lang="it-IT"/>
           </a:p>
@@ -2399,7 +2399,7 @@
           <a:p>
             <a:fld id="{0E4CDD72-A63B-C044-8A2C-F1FDCDA64E36}" type="datetimeFigureOut">
               <a:rPr lang="it-IT" smtClean="0"/>
-              <a:t>28/01/20</a:t>
+              <a:t>30/01/20</a:t>
             </a:fld>
             <a:endParaRPr lang="it-IT"/>
           </a:p>
@@ -2687,7 +2687,7 @@
           <a:p>
             <a:fld id="{0E4CDD72-A63B-C044-8A2C-F1FDCDA64E36}" type="datetimeFigureOut">
               <a:rPr lang="it-IT" smtClean="0"/>
-              <a:t>28/01/20</a:t>
+              <a:t>30/01/20</a:t>
             </a:fld>
             <a:endParaRPr lang="it-IT"/>
           </a:p>
@@ -2928,7 +2928,7 @@
           <a:p>
             <a:fld id="{0E4CDD72-A63B-C044-8A2C-F1FDCDA64E36}" type="datetimeFigureOut">
               <a:rPr lang="it-IT" smtClean="0"/>
-              <a:t>28/01/20</a:t>
+              <a:t>30/01/20</a:t>
             </a:fld>
             <a:endParaRPr lang="it-IT"/>
           </a:p>
@@ -10410,7 +10410,7 @@
             </a:r>
             <a:r>
               <a:rPr lang="it-IT" dirty="0" err="1"/>
-              <a:t>arches</a:t>
+              <a:t>edges</a:t>
             </a:r>
             <a:r>
               <a:rPr lang="it-IT" dirty="0"/>
@@ -12442,35 +12442,6 @@
           <a:chExt cx="0" cy="0"/>
         </a:xfrm>
       </p:grpSpPr>
-      <p:pic>
-        <p:nvPicPr>
-          <p:cNvPr id="9" name="Segnaposto contenuto 8">
-            <a:extLst>
-              <a:ext uri="{FF2B5EF4-FFF2-40B4-BE49-F238E27FC236}">
-                <a16:creationId xmlns:a16="http://schemas.microsoft.com/office/drawing/2014/main" id="{BF746654-6B3B-9F4B-A5FB-5AA54C6FD2A5}"/>
-              </a:ext>
-            </a:extLst>
-          </p:cNvPr>
-          <p:cNvPicPr>
-            <a:picLocks noGrp="1" noChangeAspect="1"/>
-          </p:cNvPicPr>
-          <p:nvPr>
-            <p:ph idx="1"/>
-          </p:nvPr>
-        </p:nvPicPr>
-        <p:blipFill>
-          <a:blip r:embed="rId2"/>
-          <a:stretch>
-            <a:fillRect/>
-          </a:stretch>
-        </p:blipFill>
-        <p:spPr>
-          <a:xfrm>
-            <a:off x="884152" y="309356"/>
-            <a:ext cx="8540613" cy="6021654"/>
-          </a:xfrm>
-        </p:spPr>
-      </p:pic>
       <p:sp>
         <p:nvSpPr>
           <p:cNvPr id="12" name="CasellaDiTesto 11">
@@ -12578,7 +12549,7 @@
         <p:spPr>
           <a:xfrm>
             <a:off x="8918369" y="875228"/>
-            <a:ext cx="2707574" cy="2308324"/>
+            <a:ext cx="2707574" cy="2862322"/>
           </a:xfrm>
           <a:prstGeom prst="rect">
             <a:avLst/>
@@ -12594,7 +12565,39 @@
             <a:pPr algn="just"/>
             <a:r>
               <a:rPr lang="it-IT" dirty="0" err="1"/>
-              <a:t>As</a:t>
+              <a:t>Values</a:t>
+            </a:r>
+            <a:r>
+              <a:rPr lang="it-IT" dirty="0"/>
+              <a:t> of </a:t>
+            </a:r>
+            <a:r>
+              <a:rPr lang="it-IT" dirty="0" err="1"/>
+              <a:t>R</a:t>
+            </a:r>
+            <a:r>
+              <a:rPr lang="it-IT" dirty="0"/>
+              <a:t> </a:t>
+            </a:r>
+            <a:r>
+              <a:rPr lang="it-IT" dirty="0" err="1"/>
+              <a:t>close</a:t>
+            </a:r>
+            <a:r>
+              <a:rPr lang="it-IT" dirty="0"/>
+              <a:t> to 1 </a:t>
+            </a:r>
+            <a:r>
+              <a:rPr lang="it-IT" dirty="0" err="1"/>
+              <a:t>imply</a:t>
+            </a:r>
+            <a:r>
+              <a:rPr lang="it-IT" dirty="0"/>
+              <a:t> </a:t>
+            </a:r>
+            <a:r>
+              <a:rPr lang="it-IT" dirty="0" err="1"/>
+              <a:t>that</a:t>
             </a:r>
             <a:r>
               <a:rPr lang="it-IT" dirty="0"/>
@@ -12602,30 +12605,119 @@
             </a:r>
             <a:r>
               <a:rPr lang="it-IT" dirty="0" err="1"/>
-              <a:t>value</a:t>
-            </a:r>
-            <a:r>
-              <a:rPr lang="it-IT" dirty="0"/>
-              <a:t> of k </a:t>
-            </a:r>
-            <a:r>
-              <a:rPr lang="it-IT" dirty="0" err="1"/>
-              <a:t>increases</a:t>
-            </a:r>
-            <a:r>
-              <a:rPr lang="it-IT" dirty="0"/>
-              <a:t>, </a:t>
-            </a:r>
-          </a:p>
-          <a:p>
-            <a:pPr algn="just"/>
+              <a:t>two</a:t>
+            </a:r>
+            <a:r>
+              <a:rPr lang="it-IT" dirty="0"/>
+              <a:t> </a:t>
+            </a:r>
+            <a:r>
+              <a:rPr lang="it-IT" dirty="0" err="1"/>
+              <a:t>algorithms</a:t>
+            </a:r>
+            <a:r>
+              <a:rPr lang="it-IT" dirty="0"/>
+              <a:t> </a:t>
+            </a:r>
+            <a:r>
+              <a:rPr lang="it-IT" dirty="0" err="1"/>
+              <a:t>achieve</a:t>
+            </a:r>
+            <a:r>
+              <a:rPr lang="it-IT" dirty="0"/>
+              <a:t> </a:t>
+            </a:r>
+            <a:r>
+              <a:rPr lang="it-IT" dirty="0" err="1"/>
+              <a:t>exactly</a:t>
+            </a:r>
             <a:r>
               <a:rPr lang="it-IT" dirty="0"/>
               <a:t> the </a:t>
             </a:r>
             <a:r>
               <a:rPr lang="it-IT" dirty="0" err="1"/>
-              <a:t>greedy</a:t>
+              <a:t>same</a:t>
+            </a:r>
+            <a:r>
+              <a:rPr lang="it-IT" dirty="0"/>
+              <a:t> </a:t>
+            </a:r>
+            <a:r>
+              <a:rPr lang="it-IT" dirty="0" err="1"/>
+              <a:t>cost</a:t>
+            </a:r>
+            <a:r>
+              <a:rPr lang="it-IT" dirty="0"/>
+              <a:t>, in </a:t>
+            </a:r>
+            <a:r>
+              <a:rPr lang="it-IT" dirty="0" err="1"/>
+              <a:t>which</a:t>
+            </a:r>
+            <a:r>
+              <a:rPr lang="it-IT" dirty="0"/>
+              <a:t> case </a:t>
+            </a:r>
+            <a:r>
+              <a:rPr lang="it-IT" dirty="0" err="1"/>
+              <a:t>Greedy</a:t>
+            </a:r>
+            <a:r>
+              <a:rPr lang="it-IT" dirty="0"/>
+              <a:t> </a:t>
+            </a:r>
+            <a:r>
+              <a:rPr lang="it-IT" dirty="0" err="1"/>
+              <a:t>performs</a:t>
+            </a:r>
+            <a:r>
+              <a:rPr lang="it-IT" dirty="0"/>
+              <a:t> </a:t>
+            </a:r>
+            <a:r>
+              <a:rPr lang="it-IT"/>
+              <a:t>optimally</a:t>
+            </a:r>
+            <a:r>
+              <a:rPr lang="it-IT" dirty="0"/>
+              <a:t>. The </a:t>
+            </a:r>
+            <a:r>
+              <a:rPr lang="it-IT" dirty="0" err="1"/>
+              <a:t>closer</a:t>
+            </a:r>
+            <a:r>
+              <a:rPr lang="it-IT" dirty="0"/>
+              <a:t> </a:t>
+            </a:r>
+            <a:r>
+              <a:rPr lang="it-IT" dirty="0" err="1"/>
+              <a:t>R</a:t>
+            </a:r>
+            <a:r>
+              <a:rPr lang="it-IT" dirty="0"/>
+              <a:t> </a:t>
+            </a:r>
+            <a:r>
+              <a:rPr lang="it-IT" dirty="0" err="1"/>
+              <a:t>is</a:t>
+            </a:r>
+            <a:r>
+              <a:rPr lang="it-IT" dirty="0"/>
+              <a:t> to 1, the </a:t>
+            </a:r>
+            <a:r>
+              <a:rPr lang="it-IT" dirty="0" err="1"/>
+              <a:t>better</a:t>
+            </a:r>
+            <a:r>
+              <a:rPr lang="it-IT" dirty="0"/>
+              <a:t> the performance of the </a:t>
+            </a:r>
+            <a:r>
+              <a:rPr lang="it-IT" dirty="0" err="1"/>
+              <a:t>Greedy</a:t>
             </a:r>
             <a:r>
               <a:rPr lang="it-IT" dirty="0"/>
@@ -12637,79 +12729,7 @@
             </a:r>
             <a:r>
               <a:rPr lang="it-IT" dirty="0"/>
-              <a:t> </a:t>
-            </a:r>
-            <a:r>
-              <a:rPr lang="it-IT" dirty="0" err="1"/>
-              <a:t>increasingly</a:t>
-            </a:r>
-            <a:r>
-              <a:rPr lang="it-IT" dirty="0"/>
-              <a:t> </a:t>
-            </a:r>
-            <a:r>
-              <a:rPr lang="it-IT" dirty="0" err="1"/>
-              <a:t>moves</a:t>
-            </a:r>
-            <a:r>
-              <a:rPr lang="it-IT" dirty="0"/>
-              <a:t> </a:t>
-            </a:r>
-            <a:r>
-              <a:rPr lang="it-IT" dirty="0" err="1"/>
-              <a:t>away</a:t>
-            </a:r>
-            <a:r>
-              <a:rPr lang="it-IT" dirty="0"/>
-              <a:t> from the </a:t>
-            </a:r>
-            <a:r>
-              <a:rPr lang="it-IT" dirty="0" err="1"/>
-              <a:t>optimal</a:t>
-            </a:r>
-            <a:r>
-              <a:rPr lang="it-IT" dirty="0"/>
-              <a:t> </a:t>
-            </a:r>
-            <a:r>
-              <a:rPr lang="it-IT" dirty="0" err="1"/>
-              <a:t>anonymization</a:t>
-            </a:r>
-            <a:r>
-              <a:rPr lang="it-IT" dirty="0"/>
-              <a:t> </a:t>
-            </a:r>
-            <a:r>
-              <a:rPr lang="it-IT" dirty="0" err="1"/>
-              <a:t>values</a:t>
-            </a:r>
-            <a:r>
-              <a:rPr lang="it-IT" dirty="0"/>
-              <a:t>, in a linear way </a:t>
-            </a:r>
-            <a:r>
-              <a:rPr lang="it-IT" dirty="0" err="1"/>
-              <a:t>as</a:t>
-            </a:r>
-            <a:r>
-              <a:rPr lang="it-IT" dirty="0"/>
-              <a:t> </a:t>
-            </a:r>
-            <a:r>
-              <a:rPr lang="it-IT" dirty="0" err="1"/>
-              <a:t>value</a:t>
-            </a:r>
-            <a:r>
-              <a:rPr lang="it-IT" dirty="0"/>
-              <a:t> of k-</a:t>
-            </a:r>
-            <a:r>
-              <a:rPr lang="it-IT" dirty="0" err="1"/>
-              <a:t>degree</a:t>
-            </a:r>
-            <a:r>
-              <a:rPr lang="it-IT" dirty="0"/>
-              <a:t>.</a:t>
+              <a:t>. </a:t>
             </a:r>
           </a:p>
           <a:p>
@@ -12718,6 +12738,35 @@
           </a:p>
         </p:txBody>
       </p:sp>
+      <p:pic>
+        <p:nvPicPr>
+          <p:cNvPr id="5" name="Segnaposto contenuto 4">
+            <a:extLst>
+              <a:ext uri="{FF2B5EF4-FFF2-40B4-BE49-F238E27FC236}">
+                <a16:creationId xmlns:a16="http://schemas.microsoft.com/office/drawing/2014/main" id="{A66E5FE4-3D68-3447-9CFC-C43A655ED87C}"/>
+              </a:ext>
+            </a:extLst>
+          </p:cNvPr>
+          <p:cNvPicPr>
+            <a:picLocks noGrp="1" noChangeAspect="1"/>
+          </p:cNvPicPr>
+          <p:nvPr>
+            <p:ph idx="1"/>
+          </p:nvPr>
+        </p:nvPicPr>
+        <p:blipFill>
+          <a:blip r:embed="rId2"/>
+          <a:stretch>
+            <a:fillRect/>
+          </a:stretch>
+        </p:blipFill>
+        <p:spPr>
+          <a:xfrm>
+            <a:off x="0" y="678688"/>
+            <a:ext cx="8918369" cy="6179312"/>
+          </a:xfrm>
+        </p:spPr>
+      </p:pic>
     </p:spTree>
     <p:extLst>
       <p:ext uri="{BB962C8B-B14F-4D97-AF65-F5344CB8AC3E}">

</xml_diff>

<commit_message>
Problemi con grafici del supergraph. Risoluzione effettuate
</commit_message>
<xml_diff>
--- a/Presentazione.pptx
+++ b/Presentazione.pptx
@@ -7460,36 +7460,6 @@
           </a:p>
         </p:txBody>
       </p:sp>
-      <p:pic>
-        <p:nvPicPr>
-          <p:cNvPr id="11" name="Immagine 10">
-            <a:extLst>
-              <a:ext uri="{FF2B5EF4-FFF2-40B4-BE49-F238E27FC236}">
-                <a16:creationId xmlns:a16="http://schemas.microsoft.com/office/drawing/2014/main" id="{722D6F5B-F5A1-0042-AC7A-D6ACD4320762}"/>
-              </a:ext>
-            </a:extLst>
-          </p:cNvPr>
-          <p:cNvPicPr>
-            <a:picLocks noChangeAspect="1"/>
-          </p:cNvPicPr>
-          <p:nvPr/>
-        </p:nvPicPr>
-        <p:blipFill>
-          <a:blip r:embed="rId3"/>
-          <a:stretch>
-            <a:fillRect/>
-          </a:stretch>
-        </p:blipFill>
-        <p:spPr>
-          <a:xfrm>
-            <a:off x="6927551" y="321734"/>
-            <a:ext cx="3873560" cy="2905170"/>
-          </a:xfrm>
-          <a:prstGeom prst="rect">
-            <a:avLst/>
-          </a:prstGeom>
-        </p:spPr>
-      </p:pic>
       <p:sp>
         <p:nvSpPr>
           <p:cNvPr id="18" name="Rectangle 17">
@@ -7637,7 +7607,7 @@
           <p:nvPr/>
         </p:nvPicPr>
         <p:blipFill>
-          <a:blip r:embed="rId4"/>
+          <a:blip r:embed="rId3"/>
           <a:stretch>
             <a:fillRect/>
           </a:stretch>
@@ -7654,10 +7624,40 @@
       </p:pic>
       <p:pic>
         <p:nvPicPr>
-          <p:cNvPr id="9" name="Immagine 8">
-            <a:extLst>
-              <a:ext uri="{FF2B5EF4-FFF2-40B4-BE49-F238E27FC236}">
-                <a16:creationId xmlns:a16="http://schemas.microsoft.com/office/drawing/2014/main" id="{13BB3F3D-7EBC-EE4E-B592-6B966157EAC9}"/>
+          <p:cNvPr id="3" name="Immagine 2">
+            <a:extLst>
+              <a:ext uri="{FF2B5EF4-FFF2-40B4-BE49-F238E27FC236}">
+                <a16:creationId xmlns:a16="http://schemas.microsoft.com/office/drawing/2014/main" id="{841F513A-360C-AD4B-BB3C-9BF55AD6A864}"/>
+              </a:ext>
+            </a:extLst>
+          </p:cNvPr>
+          <p:cNvPicPr>
+            <a:picLocks noChangeAspect="1"/>
+          </p:cNvPicPr>
+          <p:nvPr/>
+        </p:nvPicPr>
+        <p:blipFill>
+          <a:blip r:embed="rId4"/>
+          <a:stretch>
+            <a:fillRect/>
+          </a:stretch>
+        </p:blipFill>
+        <p:spPr>
+          <a:xfrm>
+            <a:off x="7038340" y="3598545"/>
+            <a:ext cx="3762771" cy="2822078"/>
+          </a:xfrm>
+          <a:prstGeom prst="rect">
+            <a:avLst/>
+          </a:prstGeom>
+        </p:spPr>
+      </p:pic>
+      <p:pic>
+        <p:nvPicPr>
+          <p:cNvPr id="6" name="Immagine 5">
+            <a:extLst>
+              <a:ext uri="{FF2B5EF4-FFF2-40B4-BE49-F238E27FC236}">
+                <a16:creationId xmlns:a16="http://schemas.microsoft.com/office/drawing/2014/main" id="{5A1EDC27-2F1E-9F48-8BBE-93C3B4061B7F}"/>
               </a:ext>
             </a:extLst>
           </p:cNvPr>
@@ -7674,8 +7674,8 @@
         </p:blipFill>
         <p:spPr>
           <a:xfrm>
-            <a:off x="7023958" y="3631096"/>
-            <a:ext cx="3680746" cy="2760560"/>
+            <a:off x="7068820" y="427684"/>
+            <a:ext cx="3732291" cy="2799219"/>
           </a:xfrm>
           <a:prstGeom prst="rect">
             <a:avLst/>

</xml_diff>